<commit_message>
Skeletion for differentiated tcService support
</commit_message>
<xml_diff>
--- a/Doc/KVMHv.pptx
+++ b/Doc/KVMHv.pptx
@@ -280,7 +280,7 @@
     </p:spTree>
     <p:extLst>
       <p:ext uri="{BB962C8B-B14F-4D97-AF65-F5344CB8AC3E}">
-        <p14:creationId xmlns:mc="http://schemas.openxmlformats.org/markup-compatibility/2006" xmlns:mv="urn:schemas-microsoft-com:mac:vml" xmlns:p14="http://schemas.microsoft.com/office/powerpoint/2010/main" xmlns:p="http://schemas.openxmlformats.org/presentationml/2006/main" xmlns:r="http://schemas.openxmlformats.org/officeDocument/2006/relationships" xmlns:a="http://schemas.openxmlformats.org/drawingml/2006/main" xmlns="" val="179765844"/>
+        <p14:creationId xmlns="" xmlns:a="http://schemas.openxmlformats.org/drawingml/2006/main" xmlns:r="http://schemas.openxmlformats.org/officeDocument/2006/relationships" xmlns:p="http://schemas.openxmlformats.org/presentationml/2006/main" xmlns:p14="http://schemas.microsoft.com/office/powerpoint/2010/main" xmlns:mv="urn:schemas-microsoft-com:mac:vml" xmlns:mc="http://schemas.openxmlformats.org/markup-compatibility/2006" val="179765844"/>
       </p:ext>
     </p:extLst>
   </p:cSld>
@@ -543,7 +543,7 @@
     </p:spTree>
     <p:extLst>
       <p:ext uri="{BB962C8B-B14F-4D97-AF65-F5344CB8AC3E}">
-        <p14:creationId xmlns:mc="http://schemas.openxmlformats.org/markup-compatibility/2006" xmlns:mv="urn:schemas-microsoft-com:mac:vml" xmlns:p14="http://schemas.microsoft.com/office/powerpoint/2010/main" xmlns:p="http://schemas.openxmlformats.org/presentationml/2006/main" xmlns:r="http://schemas.openxmlformats.org/officeDocument/2006/relationships" xmlns:a="http://schemas.openxmlformats.org/drawingml/2006/main" xmlns="" val="2478377920"/>
+        <p14:creationId xmlns="" xmlns:a="http://schemas.openxmlformats.org/drawingml/2006/main" xmlns:r="http://schemas.openxmlformats.org/officeDocument/2006/relationships" xmlns:p="http://schemas.openxmlformats.org/presentationml/2006/main" xmlns:p14="http://schemas.microsoft.com/office/powerpoint/2010/main" xmlns:mv="urn:schemas-microsoft-com:mac:vml" xmlns:mc="http://schemas.openxmlformats.org/markup-compatibility/2006" val="2478377920"/>
       </p:ext>
     </p:extLst>
   </p:cSld>
@@ -4489,7 +4489,7 @@
         </p:nvCxnSpPr>
         <p:spPr>
           <a:xfrm rot="5400000">
-            <a:off x="4001294" y="4761706"/>
+            <a:off x="3848894" y="4761706"/>
             <a:ext cx="1295400" cy="1588"/>
           </a:xfrm>
           <a:prstGeom prst="line">
@@ -4941,7 +4941,7 @@
     </p:spTree>
     <p:extLst>
       <p:ext uri="{BB962C8B-B14F-4D97-AF65-F5344CB8AC3E}">
-        <p14:creationId xmlns:mc="http://schemas.openxmlformats.org/markup-compatibility/2006" xmlns:mv="urn:schemas-microsoft-com:mac:vml" xmlns:p14="http://schemas.microsoft.com/office/powerpoint/2010/main" xmlns:p="http://schemas.openxmlformats.org/presentationml/2006/main" xmlns:r="http://schemas.openxmlformats.org/officeDocument/2006/relationships" xmlns:a="http://schemas.openxmlformats.org/drawingml/2006/main" xmlns="" val="3115145481"/>
+        <p14:creationId xmlns="" xmlns:a="http://schemas.openxmlformats.org/drawingml/2006/main" xmlns:r="http://schemas.openxmlformats.org/officeDocument/2006/relationships" xmlns:p="http://schemas.openxmlformats.org/presentationml/2006/main" xmlns:p14="http://schemas.microsoft.com/office/powerpoint/2010/main" xmlns:mv="urn:schemas-microsoft-com:mac:vml" xmlns:mc="http://schemas.openxmlformats.org/markup-compatibility/2006" val="3115145481"/>
       </p:ext>
     </p:extLst>
   </p:cSld>

</xml_diff>

<commit_message>
Slight changes to make testing easier
</commit_message>
<xml_diff>
--- a/Doc/KVMHv.pptx
+++ b/Doc/KVMHv.pptx
@@ -204,7 +204,7 @@
             <a:fld id="{E0EBE68B-C5D1-4AEF-ABE6-2E382B6B8028}" type="datetimeFigureOut">
               <a:rPr lang="en-US" smtClean="0"/>
               <a:pPr/>
-              <a:t>8/31/13</a:t>
+              <a:t>9/1/13</a:t>
             </a:fld>
             <a:endParaRPr lang="en-US"/>
           </a:p>
@@ -280,7 +280,7 @@
     </p:spTree>
     <p:extLst>
       <p:ext uri="{BB962C8B-B14F-4D97-AF65-F5344CB8AC3E}">
-        <p14:creationId xmlns="" xmlns:a="http://schemas.openxmlformats.org/drawingml/2006/main" xmlns:r="http://schemas.openxmlformats.org/officeDocument/2006/relationships" xmlns:p="http://schemas.openxmlformats.org/presentationml/2006/main" xmlns:p14="http://schemas.microsoft.com/office/powerpoint/2010/main" xmlns:mv="urn:schemas-microsoft-com:mac:vml" xmlns:mc="http://schemas.openxmlformats.org/markup-compatibility/2006" val="179765844"/>
+        <p14:creationId xmlns:mc="http://schemas.openxmlformats.org/markup-compatibility/2006" xmlns:mv="urn:schemas-microsoft-com:mac:vml" xmlns:p14="http://schemas.microsoft.com/office/powerpoint/2010/main" xmlns:p="http://schemas.openxmlformats.org/presentationml/2006/main" xmlns:r="http://schemas.openxmlformats.org/officeDocument/2006/relationships" xmlns:a="http://schemas.openxmlformats.org/drawingml/2006/main" xmlns="" val="179765844"/>
       </p:ext>
     </p:extLst>
   </p:cSld>
@@ -372,7 +372,7 @@
             <a:fld id="{C4A7A8CC-7372-45F7-81DB-D555F5C65FA2}" type="datetimeFigureOut">
               <a:rPr lang="en-US" smtClean="0"/>
               <a:pPr/>
-              <a:t>8/31/13</a:t>
+              <a:t>9/1/13</a:t>
             </a:fld>
             <a:endParaRPr lang="en-US"/>
           </a:p>
@@ -543,7 +543,7 @@
     </p:spTree>
     <p:extLst>
       <p:ext uri="{BB962C8B-B14F-4D97-AF65-F5344CB8AC3E}">
-        <p14:creationId xmlns="" xmlns:a="http://schemas.openxmlformats.org/drawingml/2006/main" xmlns:r="http://schemas.openxmlformats.org/officeDocument/2006/relationships" xmlns:p="http://schemas.openxmlformats.org/presentationml/2006/main" xmlns:p14="http://schemas.microsoft.com/office/powerpoint/2010/main" xmlns:mv="urn:schemas-microsoft-com:mac:vml" xmlns:mc="http://schemas.openxmlformats.org/markup-compatibility/2006" val="2478377920"/>
+        <p14:creationId xmlns:mc="http://schemas.openxmlformats.org/markup-compatibility/2006" xmlns:mv="urn:schemas-microsoft-com:mac:vml" xmlns:p14="http://schemas.microsoft.com/office/powerpoint/2010/main" xmlns:p="http://schemas.openxmlformats.org/presentationml/2006/main" xmlns:r="http://schemas.openxmlformats.org/officeDocument/2006/relationships" xmlns:a="http://schemas.openxmlformats.org/drawingml/2006/main" xmlns="" val="2478377920"/>
       </p:ext>
     </p:extLst>
   </p:cSld>
@@ -915,7 +915,7 @@
             <a:fld id="{3F9A5CCD-BD94-7446-AF68-FA1C96765699}" type="datetime1">
               <a:rPr lang="en-US" smtClean="0"/>
               <a:pPr/>
-              <a:t>8/31/13</a:t>
+              <a:t>9/1/13</a:t>
             </a:fld>
             <a:endParaRPr lang="en-US"/>
           </a:p>
@@ -1063,7 +1063,7 @@
             <a:fld id="{F673A786-9767-FE49-9993-F6A312CB6A25}" type="datetime1">
               <a:rPr lang="en-US" smtClean="0"/>
               <a:pPr/>
-              <a:t>8/31/13</a:t>
+              <a:t>9/1/13</a:t>
             </a:fld>
             <a:endParaRPr lang="en-US"/>
           </a:p>
@@ -1240,7 +1240,7 @@
             <a:fld id="{FB3A69AC-16F0-A149-9966-57CD8630D3A8}" type="datetime1">
               <a:rPr lang="en-US" smtClean="0"/>
               <a:pPr/>
-              <a:t>8/31/13</a:t>
+              <a:t>9/1/13</a:t>
             </a:fld>
             <a:endParaRPr lang="en-US"/>
           </a:p>
@@ -1407,7 +1407,7 @@
             <a:fld id="{4637C8A4-36FA-0B47-80C8-A643D538DC16}" type="datetime1">
               <a:rPr lang="en-US" smtClean="0"/>
               <a:pPr/>
-              <a:t>8/31/13</a:t>
+              <a:t>9/1/13</a:t>
             </a:fld>
             <a:endParaRPr lang="en-US"/>
           </a:p>
@@ -1631,7 +1631,7 @@
             <a:fld id="{E5C27FD5-BFAF-D349-9BE2-B81482BC39CD}" type="datetime1">
               <a:rPr lang="en-US" smtClean="0"/>
               <a:pPr/>
-              <a:t>8/31/13</a:t>
+              <a:t>9/1/13</a:t>
             </a:fld>
             <a:endParaRPr lang="en-US"/>
           </a:p>
@@ -1916,7 +1916,7 @@
             <a:fld id="{D1FA60F8-C20B-2948-85A4-F1FE3710B60E}" type="datetime1">
               <a:rPr lang="en-US" smtClean="0"/>
               <a:pPr/>
-              <a:t>8/31/13</a:t>
+              <a:t>9/1/13</a:t>
             </a:fld>
             <a:endParaRPr lang="en-US"/>
           </a:p>
@@ -2335,7 +2335,7 @@
             <a:fld id="{E3BF1BCF-DCBA-2C4C-B9F0-29E1B0430F96}" type="datetime1">
               <a:rPr lang="en-US" smtClean="0"/>
               <a:pPr/>
-              <a:t>8/31/13</a:t>
+              <a:t>9/1/13</a:t>
             </a:fld>
             <a:endParaRPr lang="en-US"/>
           </a:p>
@@ -2450,7 +2450,7 @@
             <a:fld id="{00565104-BF06-6F4F-BD51-0FDEFDC5410E}" type="datetime1">
               <a:rPr lang="en-US" smtClean="0"/>
               <a:pPr/>
-              <a:t>8/31/13</a:t>
+              <a:t>9/1/13</a:t>
             </a:fld>
             <a:endParaRPr lang="en-US"/>
           </a:p>
@@ -2542,7 +2542,7 @@
             <a:fld id="{15B764B1-84D4-E74A-8E7D-91E7A6978174}" type="datetime1">
               <a:rPr lang="en-US" smtClean="0"/>
               <a:pPr/>
-              <a:t>8/31/13</a:t>
+              <a:t>9/1/13</a:t>
             </a:fld>
             <a:endParaRPr lang="en-US"/>
           </a:p>
@@ -2816,7 +2816,7 @@
             <a:fld id="{B59F0B7B-869B-3E4D-87AD-433CC8C1B8E8}" type="datetime1">
               <a:rPr lang="en-US" smtClean="0"/>
               <a:pPr/>
-              <a:t>8/31/13</a:t>
+              <a:t>9/1/13</a:t>
             </a:fld>
             <a:endParaRPr lang="en-US"/>
           </a:p>
@@ -3066,7 +3066,7 @@
             <a:fld id="{DABAEF2E-190C-574F-A31A-65B51332CC22}" type="datetime1">
               <a:rPr lang="en-US" smtClean="0"/>
               <a:pPr/>
-              <a:t>8/31/13</a:t>
+              <a:t>9/1/13</a:t>
             </a:fld>
             <a:endParaRPr lang="en-US"/>
           </a:p>
@@ -3276,7 +3276,7 @@
             <a:fld id="{1FC80C17-44DD-FC4B-9DA6-74B126DD86BC}" type="datetime1">
               <a:rPr lang="en-US" smtClean="0"/>
               <a:pPr/>
-              <a:t>8/31/13</a:t>
+              <a:t>9/1/13</a:t>
             </a:fld>
             <a:endParaRPr lang="en-US"/>
           </a:p>
@@ -3904,8 +3904,8 @@
         </p:nvSpPr>
         <p:spPr bwMode="auto">
           <a:xfrm>
-            <a:off x="457200" y="1371600"/>
-            <a:ext cx="1905000" cy="2209800"/>
+            <a:off x="457200" y="2286000"/>
+            <a:ext cx="1828800" cy="1295400"/>
           </a:xfrm>
           <a:prstGeom prst="rect">
             <a:avLst/>
@@ -3949,8 +3949,8 @@
         </p:nvSpPr>
         <p:spPr bwMode="auto">
           <a:xfrm>
-            <a:off x="5257800" y="1295400"/>
-            <a:ext cx="2438400" cy="2590800"/>
+            <a:off x="4572000" y="1295400"/>
+            <a:ext cx="3124200" cy="2590800"/>
           </a:xfrm>
           <a:prstGeom prst="rect">
             <a:avLst/>
@@ -4040,7 +4040,7 @@
         </p:nvSpPr>
         <p:spPr bwMode="auto">
           <a:xfrm>
-            <a:off x="457200" y="1563469"/>
+            <a:off x="457200" y="2401669"/>
             <a:ext cx="1905000" cy="646331"/>
           </a:xfrm>
           <a:prstGeom prst="rect">
@@ -4093,8 +4093,8 @@
         </p:nvSpPr>
         <p:spPr bwMode="auto">
           <a:xfrm>
-            <a:off x="457200" y="2310824"/>
-            <a:ext cx="1905000" cy="584776"/>
+            <a:off x="457200" y="2981980"/>
+            <a:ext cx="1905000" cy="523220"/>
           </a:xfrm>
           <a:prstGeom prst="rect">
             <a:avLst/>
@@ -4114,24 +4114,24 @@
           <a:lstStyle/>
           <a:p>
             <a:r>
-              <a:rPr lang="en-US" sz="1600" dirty="0" smtClean="0"/>
+              <a:rPr lang="en-US" sz="1400" dirty="0" smtClean="0"/>
               <a:t>Tao (for </a:t>
             </a:r>
             <a:r>
-              <a:rPr lang="en-US" sz="1600" dirty="0" err="1" smtClean="0"/>
+              <a:rPr lang="en-US" sz="1400" dirty="0" err="1" smtClean="0"/>
               <a:t>Hv</a:t>
             </a:r>
             <a:r>
-              <a:rPr lang="en-US" sz="1600" dirty="0" smtClean="0"/>
+              <a:rPr lang="en-US" sz="1400" dirty="0" smtClean="0"/>
               <a:t>)</a:t>
             </a:r>
           </a:p>
           <a:p>
             <a:r>
-              <a:rPr lang="en-US" sz="1600" dirty="0" smtClean="0"/>
+              <a:rPr lang="en-US" sz="1400" dirty="0" smtClean="0"/>
               <a:t>Policy Public Key</a:t>
             </a:r>
-            <a:endParaRPr lang="en-US" sz="1600" dirty="0"/>
+            <a:endParaRPr lang="en-US" sz="1400" dirty="0"/>
           </a:p>
         </p:txBody>
       </p:sp>
@@ -4343,8 +4343,8 @@
         </p:nvSpPr>
         <p:spPr bwMode="auto">
           <a:xfrm>
-            <a:off x="5334000" y="1828800"/>
-            <a:ext cx="2514600" cy="830997"/>
+            <a:off x="5334000" y="2677180"/>
+            <a:ext cx="2514600" cy="523220"/>
           </a:xfrm>
           <a:prstGeom prst="rect">
             <a:avLst/>
@@ -4364,27 +4364,29 @@
           <a:lstStyle/>
           <a:p>
             <a:r>
-              <a:rPr lang="en-US" sz="1600" dirty="0" err="1" smtClean="0">
+              <a:rPr lang="en-US" sz="1400" dirty="0" err="1" smtClean="0">
                 <a:solidFill>
                   <a:srgbClr val="FF0000"/>
                 </a:solidFill>
               </a:rPr>
               <a:t>tcKvmGuestOsService.exe</a:t>
             </a:r>
-            <a:endParaRPr lang="en-US" sz="1600" dirty="0" smtClean="0"/>
-          </a:p>
-          <a:p>
-            <a:r>
-              <a:rPr lang="en-US" sz="1600" dirty="0" smtClean="0"/>
-              <a:t>Tao (for OS)</a:t>
-            </a:r>
-          </a:p>
-          <a:p>
-            <a:r>
-              <a:rPr lang="en-US" sz="1600" dirty="0" smtClean="0"/>
-              <a:t>Policy Public Key</a:t>
-            </a:r>
-            <a:endParaRPr lang="en-US" sz="1600" dirty="0"/>
+            <a:endParaRPr lang="en-US" sz="1400" dirty="0" smtClean="0"/>
+          </a:p>
+          <a:p>
+            <a:r>
+              <a:rPr lang="en-US" sz="1400" dirty="0" smtClean="0"/>
+              <a:t>Tao (for OS</a:t>
+            </a:r>
+            <a:r>
+              <a:rPr lang="en-US" sz="1400" dirty="0" smtClean="0"/>
+              <a:t>), Policy </a:t>
+            </a:r>
+            <a:r>
+              <a:rPr lang="en-US" sz="1400" dirty="0" smtClean="0"/>
+              <a:t>Public Key</a:t>
+            </a:r>
+            <a:endParaRPr lang="en-US" sz="1400" dirty="0"/>
           </a:p>
         </p:txBody>
       </p:sp>
@@ -4398,8 +4400,8 @@
         </p:nvSpPr>
         <p:spPr bwMode="auto">
           <a:xfrm>
-            <a:off x="5334000" y="1752600"/>
-            <a:ext cx="2286000" cy="990600"/>
+            <a:off x="5410200" y="2667000"/>
+            <a:ext cx="2209800" cy="533400"/>
           </a:xfrm>
           <a:prstGeom prst="rect">
             <a:avLst/>
@@ -4526,8 +4528,8 @@
         </p:nvSpPr>
         <p:spPr bwMode="auto">
           <a:xfrm>
-            <a:off x="5334000" y="2895600"/>
-            <a:ext cx="2133600" cy="914400"/>
+            <a:off x="4876800" y="3276600"/>
+            <a:ext cx="2590800" cy="533400"/>
           </a:xfrm>
           <a:prstGeom prst="rect">
             <a:avLst/>
@@ -4573,8 +4575,8 @@
         </p:nvSpPr>
         <p:spPr bwMode="auto">
           <a:xfrm>
-            <a:off x="5562600" y="2902803"/>
-            <a:ext cx="1905000" cy="830997"/>
+            <a:off x="4876800" y="3286780"/>
+            <a:ext cx="2667000" cy="523220"/>
           </a:xfrm>
           <a:prstGeom prst="rect">
             <a:avLst/>
@@ -4594,27 +4596,29 @@
           <a:lstStyle/>
           <a:p>
             <a:r>
-              <a:rPr lang="en-US" sz="1600" smtClean="0">
+              <a:rPr lang="en-US" sz="1400" dirty="0" err="1" smtClean="0">
                 <a:solidFill>
                   <a:srgbClr val="FF0000"/>
                 </a:solidFill>
               </a:rPr>
               <a:t>ktciodd.ko</a:t>
             </a:r>
-            <a:endParaRPr lang="en-US" sz="1600" dirty="0" smtClean="0"/>
-          </a:p>
-          <a:p>
-            <a:r>
-              <a:rPr lang="en-US" sz="1600" dirty="0" smtClean="0"/>
-              <a:t>Tao (for OS)</a:t>
-            </a:r>
-          </a:p>
-          <a:p>
-            <a:r>
-              <a:rPr lang="en-US" sz="1600" dirty="0" smtClean="0"/>
-              <a:t>Policy Public Key</a:t>
-            </a:r>
-            <a:endParaRPr lang="en-US" sz="1600" dirty="0"/>
+            <a:endParaRPr lang="en-US" sz="1400" dirty="0" smtClean="0"/>
+          </a:p>
+          <a:p>
+            <a:r>
+              <a:rPr lang="en-US" sz="1400" dirty="0" smtClean="0"/>
+              <a:t>Tao (for OS</a:t>
+            </a:r>
+            <a:r>
+              <a:rPr lang="en-US" sz="1400" dirty="0" smtClean="0"/>
+              <a:t>), Policy </a:t>
+            </a:r>
+            <a:r>
+              <a:rPr lang="en-US" sz="1400" dirty="0" smtClean="0"/>
+              <a:t>Public Key</a:t>
+            </a:r>
+            <a:endParaRPr lang="en-US" sz="1400" dirty="0"/>
           </a:p>
         </p:txBody>
       </p:sp>
@@ -4738,15 +4742,7 @@
                   <a:srgbClr val="FF0000"/>
                 </a:solidFill>
               </a:rPr>
-              <a:t>kvmtciodd</a:t>
-            </a:r>
-            <a:r>
-              <a:rPr lang="en-US" sz="1600" dirty="0" err="1" smtClean="0">
-                <a:solidFill>
-                  <a:srgbClr val="FF0000"/>
-                </a:solidFill>
-              </a:rPr>
-              <a:t>.ko</a:t>
+              <a:t>kvmtciodd.ko</a:t>
             </a:r>
             <a:endParaRPr lang="en-US" sz="1600" dirty="0" smtClean="0"/>
           </a:p>
@@ -4938,10 +4934,130 @@
           </a:p>
         </p:txBody>
       </p:sp>
+      <p:sp>
+        <p:nvSpPr>
+          <p:cNvPr id="31" name="TextBox 63"/>
+          <p:cNvSpPr txBox="1">
+            <a:spLocks noChangeArrowheads="1"/>
+          </p:cNvSpPr>
+          <p:nvPr/>
+        </p:nvSpPr>
+        <p:spPr bwMode="auto">
+          <a:xfrm>
+            <a:off x="4572000" y="1838980"/>
+            <a:ext cx="2514600" cy="523220"/>
+          </a:xfrm>
+          <a:prstGeom prst="rect">
+            <a:avLst/>
+          </a:prstGeom>
+          <a:noFill/>
+          <a:ln w="9525">
+            <a:noFill/>
+            <a:miter lim="800000"/>
+            <a:headEnd/>
+            <a:tailEnd/>
+          </a:ln>
+        </p:spPr>
+        <p:txBody>
+          <a:bodyPr wrap="square">
+            <a:spAutoFit/>
+          </a:bodyPr>
+          <a:lstStyle/>
+          <a:p>
+            <a:r>
+              <a:rPr lang="en-US" sz="1400" dirty="0" err="1" smtClean="0">
+                <a:solidFill>
+                  <a:srgbClr val="FF0000"/>
+                </a:solidFill>
+              </a:rPr>
+              <a:t>tCloudProxy</a:t>
+            </a:r>
+            <a:r>
+              <a:rPr lang="en-US" sz="1400" dirty="0" smtClean="0">
+                <a:solidFill>
+                  <a:srgbClr val="FF0000"/>
+                </a:solidFill>
+              </a:rPr>
+              <a:t> application</a:t>
+            </a:r>
+            <a:endParaRPr lang="en-US" sz="1400" dirty="0" smtClean="0"/>
+          </a:p>
+          <a:p>
+            <a:r>
+              <a:rPr lang="en-US" sz="1400" dirty="0" smtClean="0"/>
+              <a:t>Tao (for</a:t>
+            </a:r>
+            <a:r>
+              <a:rPr lang="en-US" sz="1400" dirty="0" smtClean="0"/>
+              <a:t> </a:t>
+            </a:r>
+            <a:r>
+              <a:rPr lang="en-US" sz="1400" dirty="0" smtClean="0"/>
+              <a:t>app</a:t>
+            </a:r>
+            <a:r>
+              <a:rPr lang="en-US" sz="1400" dirty="0" smtClean="0"/>
+              <a:t>), Policy </a:t>
+            </a:r>
+            <a:r>
+              <a:rPr lang="en-US" sz="1400" dirty="0" smtClean="0"/>
+              <a:t>Public Key</a:t>
+            </a:r>
+            <a:endParaRPr lang="en-US" sz="1400" dirty="0"/>
+          </a:p>
+        </p:txBody>
+      </p:sp>
+      <p:sp>
+        <p:nvSpPr>
+          <p:cNvPr id="32" name="Rectangle 7"/>
+          <p:cNvSpPr>
+            <a:spLocks noChangeArrowheads="1"/>
+          </p:cNvSpPr>
+          <p:nvPr/>
+        </p:nvSpPr>
+        <p:spPr bwMode="auto">
+          <a:xfrm>
+            <a:off x="4648200" y="1828800"/>
+            <a:ext cx="2286000" cy="685800"/>
+          </a:xfrm>
+          <a:prstGeom prst="rect">
+            <a:avLst/>
+          </a:prstGeom>
+          <a:noFill/>
+          <a:ln w="25400" algn="ctr">
+            <a:solidFill>
+              <a:schemeClr val="tx2">
+                <a:lumMod val="75000"/>
+              </a:schemeClr>
+            </a:solidFill>
+            <a:round/>
+            <a:headEnd/>
+            <a:tailEnd/>
+          </a:ln>
+        </p:spPr>
+        <p:txBody>
+          <a:bodyPr/>
+          <a:lstStyle/>
+          <a:p>
+            <a:pPr>
+              <a:lnSpc>
+                <a:spcPct val="90000"/>
+              </a:lnSpc>
+              <a:spcBef>
+                <a:spcPct val="20000"/>
+              </a:spcBef>
+              <a:buClr>
+                <a:schemeClr val="bg1"/>
+              </a:buClr>
+            </a:pPr>
+            <a:endParaRPr lang="en-US"/>
+          </a:p>
+        </p:txBody>
+      </p:sp>
     </p:spTree>
     <p:extLst>
       <p:ext uri="{BB962C8B-B14F-4D97-AF65-F5344CB8AC3E}">
-        <p14:creationId xmlns="" xmlns:a="http://schemas.openxmlformats.org/drawingml/2006/main" xmlns:r="http://schemas.openxmlformats.org/officeDocument/2006/relationships" xmlns:p="http://schemas.openxmlformats.org/presentationml/2006/main" xmlns:p14="http://schemas.microsoft.com/office/powerpoint/2010/main" xmlns:mv="urn:schemas-microsoft-com:mac:vml" xmlns:mc="http://schemas.openxmlformats.org/markup-compatibility/2006" val="3115145481"/>
+        <p14:creationId xmlns:mc="http://schemas.openxmlformats.org/markup-compatibility/2006" xmlns:mv="urn:schemas-microsoft-com:mac:vml" xmlns:p14="http://schemas.microsoft.com/office/powerpoint/2010/main" xmlns:p="http://schemas.openxmlformats.org/presentationml/2006/main" xmlns:r="http://schemas.openxmlformats.org/officeDocument/2006/relationships" xmlns:a="http://schemas.openxmlformats.org/drawingml/2006/main" xmlns="" val="3115145481"/>
       </p:ext>
     </p:extLst>
   </p:cSld>

</xml_diff>

<commit_message>
Updated diagram in Doc to reflect tcioDD in the guest.
</commit_message>
<xml_diff>
--- a/Doc/KVMHv.pptx
+++ b/Doc/KVMHv.pptx
@@ -204,7 +204,7 @@
             <a:fld id="{E0EBE68B-C5D1-4AEF-ABE6-2E382B6B8028}" type="datetimeFigureOut">
               <a:rPr lang="en-US" smtClean="0"/>
               <a:pPr/>
-              <a:t>9/22/13</a:t>
+              <a:t>9/27/13</a:t>
             </a:fld>
             <a:endParaRPr lang="en-US"/>
           </a:p>
@@ -280,7 +280,7 @@
     </p:spTree>
     <p:extLst>
       <p:ext uri="{BB962C8B-B14F-4D97-AF65-F5344CB8AC3E}">
-        <p14:creationId xmlns:mc="http://schemas.openxmlformats.org/markup-compatibility/2006" xmlns:mv="urn:schemas-microsoft-com:mac:vml" xmlns:p14="http://schemas.microsoft.com/office/powerpoint/2010/main" xmlns:p="http://schemas.openxmlformats.org/presentationml/2006/main" xmlns:r="http://schemas.openxmlformats.org/officeDocument/2006/relationships" xmlns:a="http://schemas.openxmlformats.org/drawingml/2006/main" xmlns="" val="179765844"/>
+        <p14:creationId xmlns="" xmlns:a="http://schemas.openxmlformats.org/drawingml/2006/main" xmlns:r="http://schemas.openxmlformats.org/officeDocument/2006/relationships" xmlns:p="http://schemas.openxmlformats.org/presentationml/2006/main" xmlns:p14="http://schemas.microsoft.com/office/powerpoint/2010/main" xmlns:mv="urn:schemas-microsoft-com:mac:vml" xmlns:mc="http://schemas.openxmlformats.org/markup-compatibility/2006" val="179765844"/>
       </p:ext>
     </p:extLst>
   </p:cSld>
@@ -372,7 +372,7 @@
             <a:fld id="{C4A7A8CC-7372-45F7-81DB-D555F5C65FA2}" type="datetimeFigureOut">
               <a:rPr lang="en-US" smtClean="0"/>
               <a:pPr/>
-              <a:t>9/22/13</a:t>
+              <a:t>9/27/13</a:t>
             </a:fld>
             <a:endParaRPr lang="en-US"/>
           </a:p>
@@ -543,7 +543,7 @@
     </p:spTree>
     <p:extLst>
       <p:ext uri="{BB962C8B-B14F-4D97-AF65-F5344CB8AC3E}">
-        <p14:creationId xmlns:mc="http://schemas.openxmlformats.org/markup-compatibility/2006" xmlns:mv="urn:schemas-microsoft-com:mac:vml" xmlns:p14="http://schemas.microsoft.com/office/powerpoint/2010/main" xmlns:p="http://schemas.openxmlformats.org/presentationml/2006/main" xmlns:r="http://schemas.openxmlformats.org/officeDocument/2006/relationships" xmlns:a="http://schemas.openxmlformats.org/drawingml/2006/main" xmlns="" val="2478377920"/>
+        <p14:creationId xmlns="" xmlns:a="http://schemas.openxmlformats.org/drawingml/2006/main" xmlns:r="http://schemas.openxmlformats.org/officeDocument/2006/relationships" xmlns:p="http://schemas.openxmlformats.org/presentationml/2006/main" xmlns:p14="http://schemas.microsoft.com/office/powerpoint/2010/main" xmlns:mv="urn:schemas-microsoft-com:mac:vml" xmlns:mc="http://schemas.openxmlformats.org/markup-compatibility/2006" val="2478377920"/>
       </p:ext>
     </p:extLst>
   </p:cSld>
@@ -915,7 +915,7 @@
             <a:fld id="{3F9A5CCD-BD94-7446-AF68-FA1C96765699}" type="datetime1">
               <a:rPr lang="en-US" smtClean="0"/>
               <a:pPr/>
-              <a:t>9/22/13</a:t>
+              <a:t>9/27/13</a:t>
             </a:fld>
             <a:endParaRPr lang="en-US"/>
           </a:p>
@@ -1063,7 +1063,7 @@
             <a:fld id="{F673A786-9767-FE49-9993-F6A312CB6A25}" type="datetime1">
               <a:rPr lang="en-US" smtClean="0"/>
               <a:pPr/>
-              <a:t>9/22/13</a:t>
+              <a:t>9/27/13</a:t>
             </a:fld>
             <a:endParaRPr lang="en-US"/>
           </a:p>
@@ -1240,7 +1240,7 @@
             <a:fld id="{FB3A69AC-16F0-A149-9966-57CD8630D3A8}" type="datetime1">
               <a:rPr lang="en-US" smtClean="0"/>
               <a:pPr/>
-              <a:t>9/22/13</a:t>
+              <a:t>9/27/13</a:t>
             </a:fld>
             <a:endParaRPr lang="en-US"/>
           </a:p>
@@ -1407,7 +1407,7 @@
             <a:fld id="{4637C8A4-36FA-0B47-80C8-A643D538DC16}" type="datetime1">
               <a:rPr lang="en-US" smtClean="0"/>
               <a:pPr/>
-              <a:t>9/22/13</a:t>
+              <a:t>9/27/13</a:t>
             </a:fld>
             <a:endParaRPr lang="en-US"/>
           </a:p>
@@ -1631,7 +1631,7 @@
             <a:fld id="{E5C27FD5-BFAF-D349-9BE2-B81482BC39CD}" type="datetime1">
               <a:rPr lang="en-US" smtClean="0"/>
               <a:pPr/>
-              <a:t>9/22/13</a:t>
+              <a:t>9/27/13</a:t>
             </a:fld>
             <a:endParaRPr lang="en-US"/>
           </a:p>
@@ -1916,7 +1916,7 @@
             <a:fld id="{D1FA60F8-C20B-2948-85A4-F1FE3710B60E}" type="datetime1">
               <a:rPr lang="en-US" smtClean="0"/>
               <a:pPr/>
-              <a:t>9/22/13</a:t>
+              <a:t>9/27/13</a:t>
             </a:fld>
             <a:endParaRPr lang="en-US"/>
           </a:p>
@@ -2335,7 +2335,7 @@
             <a:fld id="{E3BF1BCF-DCBA-2C4C-B9F0-29E1B0430F96}" type="datetime1">
               <a:rPr lang="en-US" smtClean="0"/>
               <a:pPr/>
-              <a:t>9/22/13</a:t>
+              <a:t>9/27/13</a:t>
             </a:fld>
             <a:endParaRPr lang="en-US"/>
           </a:p>
@@ -2450,7 +2450,7 @@
             <a:fld id="{00565104-BF06-6F4F-BD51-0FDEFDC5410E}" type="datetime1">
               <a:rPr lang="en-US" smtClean="0"/>
               <a:pPr/>
-              <a:t>9/22/13</a:t>
+              <a:t>9/27/13</a:t>
             </a:fld>
             <a:endParaRPr lang="en-US"/>
           </a:p>
@@ -2542,7 +2542,7 @@
             <a:fld id="{15B764B1-84D4-E74A-8E7D-91E7A6978174}" type="datetime1">
               <a:rPr lang="en-US" smtClean="0"/>
               <a:pPr/>
-              <a:t>9/22/13</a:t>
+              <a:t>9/27/13</a:t>
             </a:fld>
             <a:endParaRPr lang="en-US"/>
           </a:p>
@@ -2816,7 +2816,7 @@
             <a:fld id="{B59F0B7B-869B-3E4D-87AD-433CC8C1B8E8}" type="datetime1">
               <a:rPr lang="en-US" smtClean="0"/>
               <a:pPr/>
-              <a:t>9/22/13</a:t>
+              <a:t>9/27/13</a:t>
             </a:fld>
             <a:endParaRPr lang="en-US"/>
           </a:p>
@@ -3066,7 +3066,7 @@
             <a:fld id="{DABAEF2E-190C-574F-A31A-65B51332CC22}" type="datetime1">
               <a:rPr lang="en-US" smtClean="0"/>
               <a:pPr/>
-              <a:t>9/22/13</a:t>
+              <a:t>9/27/13</a:t>
             </a:fld>
             <a:endParaRPr lang="en-US"/>
           </a:p>
@@ -3276,7 +3276,7 @@
             <a:fld id="{1FC80C17-44DD-FC4B-9DA6-74B126DD86BC}" type="datetime1">
               <a:rPr lang="en-US" smtClean="0"/>
               <a:pPr/>
-              <a:t>9/22/13</a:t>
+              <a:t>9/27/13</a:t>
             </a:fld>
             <a:endParaRPr lang="en-US"/>
           </a:p>
@@ -4594,12 +4594,20 @@
           <a:lstStyle/>
           <a:p>
             <a:r>
-              <a:rPr lang="en-US" sz="1400" dirty="0" err="1" smtClean="0">
+              <a:rPr lang="en-US" sz="1400" dirty="0" smtClean="0">
                 <a:solidFill>
                   <a:srgbClr val="FF0000"/>
                 </a:solidFill>
               </a:rPr>
-              <a:t>ktciodd.ko</a:t>
+              <a:t>ktciodd</a:t>
+            </a:r>
+            <a:r>
+              <a:rPr lang="en-US" sz="1400" dirty="0" smtClean="0">
+                <a:solidFill>
+                  <a:srgbClr val="FF0000"/>
+                </a:solidFill>
+              </a:rPr>
+              <a:t>0</a:t>
             </a:r>
             <a:endParaRPr lang="en-US" sz="1400" dirty="0" smtClean="0"/>
           </a:p>
@@ -4727,12 +4735,20 @@
           <a:lstStyle/>
           <a:p>
             <a:r>
-              <a:rPr lang="en-US" sz="1600" dirty="0" err="1" smtClean="0">
+              <a:rPr lang="en-US" sz="1600" dirty="0" smtClean="0">
                 <a:solidFill>
                   <a:srgbClr val="FF0000"/>
                 </a:solidFill>
               </a:rPr>
-              <a:t>kvmtciodd.ko</a:t>
+              <a:t>kvmtciodd</a:t>
+            </a:r>
+            <a:r>
+              <a:rPr lang="en-US" sz="1600" dirty="0" smtClean="0">
+                <a:solidFill>
+                  <a:srgbClr val="FF0000"/>
+                </a:solidFill>
+              </a:rPr>
+              <a:t>0</a:t>
             </a:r>
             <a:endParaRPr lang="en-US" sz="1600" dirty="0" smtClean="0"/>
           </a:p>
@@ -5200,12 +5216,12 @@
           <a:lstStyle/>
           <a:p>
             <a:r>
-              <a:rPr lang="en-US" sz="1400" dirty="0" err="1" smtClean="0">
+              <a:rPr lang="en-US" sz="1400" dirty="0" smtClean="0">
                 <a:solidFill>
                   <a:srgbClr val="FF0000"/>
                 </a:solidFill>
               </a:rPr>
-              <a:t>tchostediodd.ko</a:t>
+              <a:t>tcioDD0</a:t>
             </a:r>
             <a:endParaRPr lang="en-US" sz="1400" dirty="0" smtClean="0"/>
           </a:p>
@@ -5417,7 +5433,7 @@
     </p:spTree>
     <p:extLst>
       <p:ext uri="{BB962C8B-B14F-4D97-AF65-F5344CB8AC3E}">
-        <p14:creationId xmlns:mc="http://schemas.openxmlformats.org/markup-compatibility/2006" xmlns:mv="urn:schemas-microsoft-com:mac:vml" xmlns:p14="http://schemas.microsoft.com/office/powerpoint/2010/main" xmlns:p="http://schemas.openxmlformats.org/presentationml/2006/main" xmlns:r="http://schemas.openxmlformats.org/officeDocument/2006/relationships" xmlns:a="http://schemas.openxmlformats.org/drawingml/2006/main" xmlns="" val="3115145481"/>
+        <p14:creationId xmlns="" xmlns:a="http://schemas.openxmlformats.org/drawingml/2006/main" xmlns:r="http://schemas.openxmlformats.org/officeDocument/2006/relationships" xmlns:p="http://schemas.openxmlformats.org/presentationml/2006/main" xmlns:p14="http://schemas.microsoft.com/office/powerpoint/2010/main" xmlns:mv="urn:schemas-microsoft-com:mac:vml" xmlns:mc="http://schemas.openxmlformats.org/markup-compatibility/2006" val="3115145481"/>
       </p:ext>
     </p:extLst>
   </p:cSld>

</xml_diff>

<commit_message>
Documentation overview, documentation for kvm node control program, new slides, initial ncp
</commit_message>
<xml_diff>
--- a/Doc/KVMHv.pptx
+++ b/Doc/KVMHv.pptx
@@ -11,7 +11,7 @@
     <p:handoutMasterId r:id="rId7"/>
   </p:handoutMasterIdLst>
   <p:sldIdLst>
-    <p:sldId id="846" r:id="rId5"/>
+    <p:sldId id="847" r:id="rId5"/>
   </p:sldIdLst>
   <p:sldSz cx="9144000" cy="6858000" type="screen4x3"/>
   <p:notesSz cx="6858000" cy="9144000"/>
@@ -204,7 +204,7 @@
             <a:fld id="{E0EBE68B-C5D1-4AEF-ABE6-2E382B6B8028}" type="datetimeFigureOut">
               <a:rPr lang="en-US" smtClean="0"/>
               <a:pPr/>
-              <a:t>10/3/13</a:t>
+              <a:t>10/13/13</a:t>
             </a:fld>
             <a:endParaRPr lang="en-US"/>
           </a:p>
@@ -280,7 +280,7 @@
     </p:spTree>
     <p:extLst>
       <p:ext uri="{BB962C8B-B14F-4D97-AF65-F5344CB8AC3E}">
-        <p14:creationId xmlns="" xmlns:a="http://schemas.openxmlformats.org/drawingml/2006/main" xmlns:r="http://schemas.openxmlformats.org/officeDocument/2006/relationships" xmlns:p="http://schemas.openxmlformats.org/presentationml/2006/main" xmlns:p14="http://schemas.microsoft.com/office/powerpoint/2010/main" xmlns:mv="urn:schemas-microsoft-com:mac:vml" xmlns:mc="http://schemas.openxmlformats.org/markup-compatibility/2006" val="179765844"/>
+        <p14:creationId xmlns:mc="http://schemas.openxmlformats.org/markup-compatibility/2006" xmlns:mv="urn:schemas-microsoft-com:mac:vml" xmlns:p14="http://schemas.microsoft.com/office/powerpoint/2010/main" xmlns:p="http://schemas.openxmlformats.org/presentationml/2006/main" xmlns:r="http://schemas.openxmlformats.org/officeDocument/2006/relationships" xmlns:a="http://schemas.openxmlformats.org/drawingml/2006/main" xmlns="" val="179765844"/>
       </p:ext>
     </p:extLst>
   </p:cSld>
@@ -372,7 +372,7 @@
             <a:fld id="{C4A7A8CC-7372-45F7-81DB-D555F5C65FA2}" type="datetimeFigureOut">
               <a:rPr lang="en-US" smtClean="0"/>
               <a:pPr/>
-              <a:t>10/3/13</a:t>
+              <a:t>10/13/13</a:t>
             </a:fld>
             <a:endParaRPr lang="en-US"/>
           </a:p>
@@ -543,7 +543,7 @@
     </p:spTree>
     <p:extLst>
       <p:ext uri="{BB962C8B-B14F-4D97-AF65-F5344CB8AC3E}">
-        <p14:creationId xmlns="" xmlns:a="http://schemas.openxmlformats.org/drawingml/2006/main" xmlns:r="http://schemas.openxmlformats.org/officeDocument/2006/relationships" xmlns:p="http://schemas.openxmlformats.org/presentationml/2006/main" xmlns:p14="http://schemas.microsoft.com/office/powerpoint/2010/main" xmlns:mv="urn:schemas-microsoft-com:mac:vml" xmlns:mc="http://schemas.openxmlformats.org/markup-compatibility/2006" val="2478377920"/>
+        <p14:creationId xmlns:mc="http://schemas.openxmlformats.org/markup-compatibility/2006" xmlns:mv="urn:schemas-microsoft-com:mac:vml" xmlns:p14="http://schemas.microsoft.com/office/powerpoint/2010/main" xmlns:p="http://schemas.openxmlformats.org/presentationml/2006/main" xmlns:r="http://schemas.openxmlformats.org/officeDocument/2006/relationships" xmlns:a="http://schemas.openxmlformats.org/drawingml/2006/main" xmlns="" val="2478377920"/>
       </p:ext>
     </p:extLst>
   </p:cSld>
@@ -915,7 +915,7 @@
             <a:fld id="{3F9A5CCD-BD94-7446-AF68-FA1C96765699}" type="datetime1">
               <a:rPr lang="en-US" smtClean="0"/>
               <a:pPr/>
-              <a:t>10/3/13</a:t>
+              <a:t>10/13/13</a:t>
             </a:fld>
             <a:endParaRPr lang="en-US"/>
           </a:p>
@@ -1063,7 +1063,7 @@
             <a:fld id="{F673A786-9767-FE49-9993-F6A312CB6A25}" type="datetime1">
               <a:rPr lang="en-US" smtClean="0"/>
               <a:pPr/>
-              <a:t>10/3/13</a:t>
+              <a:t>10/13/13</a:t>
             </a:fld>
             <a:endParaRPr lang="en-US"/>
           </a:p>
@@ -1240,7 +1240,7 @@
             <a:fld id="{FB3A69AC-16F0-A149-9966-57CD8630D3A8}" type="datetime1">
               <a:rPr lang="en-US" smtClean="0"/>
               <a:pPr/>
-              <a:t>10/3/13</a:t>
+              <a:t>10/13/13</a:t>
             </a:fld>
             <a:endParaRPr lang="en-US"/>
           </a:p>
@@ -1407,7 +1407,7 @@
             <a:fld id="{4637C8A4-36FA-0B47-80C8-A643D538DC16}" type="datetime1">
               <a:rPr lang="en-US" smtClean="0"/>
               <a:pPr/>
-              <a:t>10/3/13</a:t>
+              <a:t>10/13/13</a:t>
             </a:fld>
             <a:endParaRPr lang="en-US"/>
           </a:p>
@@ -1631,7 +1631,7 @@
             <a:fld id="{E5C27FD5-BFAF-D349-9BE2-B81482BC39CD}" type="datetime1">
               <a:rPr lang="en-US" smtClean="0"/>
               <a:pPr/>
-              <a:t>10/3/13</a:t>
+              <a:t>10/13/13</a:t>
             </a:fld>
             <a:endParaRPr lang="en-US"/>
           </a:p>
@@ -1916,7 +1916,7 @@
             <a:fld id="{D1FA60F8-C20B-2948-85A4-F1FE3710B60E}" type="datetime1">
               <a:rPr lang="en-US" smtClean="0"/>
               <a:pPr/>
-              <a:t>10/3/13</a:t>
+              <a:t>10/13/13</a:t>
             </a:fld>
             <a:endParaRPr lang="en-US"/>
           </a:p>
@@ -2335,7 +2335,7 @@
             <a:fld id="{E3BF1BCF-DCBA-2C4C-B9F0-29E1B0430F96}" type="datetime1">
               <a:rPr lang="en-US" smtClean="0"/>
               <a:pPr/>
-              <a:t>10/3/13</a:t>
+              <a:t>10/13/13</a:t>
             </a:fld>
             <a:endParaRPr lang="en-US"/>
           </a:p>
@@ -2450,7 +2450,7 @@
             <a:fld id="{00565104-BF06-6F4F-BD51-0FDEFDC5410E}" type="datetime1">
               <a:rPr lang="en-US" smtClean="0"/>
               <a:pPr/>
-              <a:t>10/3/13</a:t>
+              <a:t>10/13/13</a:t>
             </a:fld>
             <a:endParaRPr lang="en-US"/>
           </a:p>
@@ -2542,7 +2542,7 @@
             <a:fld id="{15B764B1-84D4-E74A-8E7D-91E7A6978174}" type="datetime1">
               <a:rPr lang="en-US" smtClean="0"/>
               <a:pPr/>
-              <a:t>10/3/13</a:t>
+              <a:t>10/13/13</a:t>
             </a:fld>
             <a:endParaRPr lang="en-US"/>
           </a:p>
@@ -2816,7 +2816,7 @@
             <a:fld id="{B59F0B7B-869B-3E4D-87AD-433CC8C1B8E8}" type="datetime1">
               <a:rPr lang="en-US" smtClean="0"/>
               <a:pPr/>
-              <a:t>10/3/13</a:t>
+              <a:t>10/13/13</a:t>
             </a:fld>
             <a:endParaRPr lang="en-US"/>
           </a:p>
@@ -3066,7 +3066,7 @@
             <a:fld id="{DABAEF2E-190C-574F-A31A-65B51332CC22}" type="datetime1">
               <a:rPr lang="en-US" smtClean="0"/>
               <a:pPr/>
-              <a:t>10/3/13</a:t>
+              <a:t>10/13/13</a:t>
             </a:fld>
             <a:endParaRPr lang="en-US"/>
           </a:p>
@@ -3276,7 +3276,7 @@
             <a:fld id="{1FC80C17-44DD-FC4B-9DA6-74B126DD86BC}" type="datetime1">
               <a:rPr lang="en-US" smtClean="0"/>
               <a:pPr/>
-              <a:t>10/3/13</a:t>
+              <a:t>10/13/13</a:t>
             </a:fld>
             <a:endParaRPr lang="en-US"/>
           </a:p>
@@ -3674,12 +3674,12 @@
               <a:defRPr/>
             </a:pPr>
             <a:r>
-              <a:rPr lang="en-US" sz="4000" dirty="0" smtClean="0">
+              <a:rPr lang="en-US" dirty="0" smtClean="0">
                 <a:ea typeface="+mj-ea"/>
               </a:rPr>
               <a:t>KVM Hypervisor</a:t>
             </a:r>
-            <a:endParaRPr lang="en-US" sz="4000" dirty="0">
+            <a:endParaRPr lang="en-US" dirty="0">
               <a:ea typeface="+mj-ea"/>
             </a:endParaRPr>
           </a:p>
@@ -3695,8 +3695,8 @@
         </p:nvSpPr>
         <p:spPr bwMode="auto">
           <a:xfrm>
-            <a:off x="304800" y="1143000"/>
-            <a:ext cx="7620000" cy="4343400"/>
+            <a:off x="838200" y="1143000"/>
+            <a:ext cx="7848600" cy="4343400"/>
           </a:xfrm>
           <a:prstGeom prst="rect">
             <a:avLst/>
@@ -3740,7 +3740,7 @@
         </p:nvSpPr>
         <p:spPr bwMode="auto">
           <a:xfrm>
-            <a:off x="1295400" y="5715000"/>
+            <a:off x="2057400" y="5715000"/>
             <a:ext cx="685800" cy="457200"/>
           </a:xfrm>
           <a:prstGeom prst="ellipse">
@@ -3785,7 +3785,7 @@
         </p:nvSpPr>
         <p:spPr bwMode="auto">
           <a:xfrm>
-            <a:off x="1360488" y="5791200"/>
+            <a:off x="2122488" y="5791200"/>
             <a:ext cx="544512" cy="307975"/>
           </a:xfrm>
           <a:prstGeom prst="rect">
@@ -3820,7 +3820,7 @@
         </p:nvCxnSpPr>
         <p:spPr bwMode="auto">
           <a:xfrm rot="5400000">
-            <a:off x="868682" y="3840478"/>
+            <a:off x="2468882" y="3840478"/>
             <a:ext cx="548640" cy="3"/>
           </a:xfrm>
           <a:prstGeom prst="line">
@@ -3859,8 +3859,8 @@
         </p:nvSpPr>
         <p:spPr bwMode="auto">
           <a:xfrm>
-            <a:off x="457200" y="4114006"/>
-            <a:ext cx="7315200" cy="1296194"/>
+            <a:off x="990600" y="4114006"/>
+            <a:ext cx="7543800" cy="1296194"/>
           </a:xfrm>
           <a:prstGeom prst="rect">
             <a:avLst/>
@@ -3904,8 +3904,8 @@
         </p:nvSpPr>
         <p:spPr bwMode="auto">
           <a:xfrm>
-            <a:off x="457200" y="2286000"/>
-            <a:ext cx="1828800" cy="1295400"/>
+            <a:off x="1371600" y="2444353"/>
+            <a:ext cx="1600200" cy="914400"/>
           </a:xfrm>
           <a:prstGeom prst="rect">
             <a:avLst/>
@@ -3913,7 +3913,7 @@
           <a:noFill/>
           <a:ln w="19050" algn="ctr">
             <a:solidFill>
-              <a:srgbClr val="FF0000"/>
+              <a:srgbClr val="0000FF"/>
             </a:solidFill>
             <a:round/>
             <a:headEnd/>
@@ -3949,8 +3949,8 @@
         </p:nvSpPr>
         <p:spPr bwMode="auto">
           <a:xfrm>
-            <a:off x="3429000" y="1219200"/>
-            <a:ext cx="4419600" cy="2667000"/>
+            <a:off x="4343400" y="1219200"/>
+            <a:ext cx="4343400" cy="2667000"/>
           </a:xfrm>
           <a:prstGeom prst="rect">
             <a:avLst/>
@@ -3994,7 +3994,7 @@
         </p:nvSpPr>
         <p:spPr bwMode="auto">
           <a:xfrm>
-            <a:off x="3352800" y="4872335"/>
+            <a:off x="4114800" y="4872335"/>
             <a:ext cx="1676400" cy="461665"/>
           </a:xfrm>
           <a:prstGeom prst="rect">
@@ -4040,7 +4040,7 @@
         </p:nvSpPr>
         <p:spPr bwMode="auto">
           <a:xfrm>
-            <a:off x="457200" y="2401669"/>
+            <a:off x="1371600" y="2438400"/>
             <a:ext cx="1905000" cy="615553"/>
           </a:xfrm>
           <a:prstGeom prst="rect">
@@ -4093,7 +4093,7 @@
         </p:nvSpPr>
         <p:spPr bwMode="auto">
           <a:xfrm>
-            <a:off x="457200" y="2981980"/>
+            <a:off x="1371600" y="2759333"/>
             <a:ext cx="1905000" cy="523220"/>
           </a:xfrm>
           <a:prstGeom prst="rect">
@@ -4143,7 +4143,7 @@
         </p:nvCxnSpPr>
         <p:spPr bwMode="auto">
           <a:xfrm rot="5400000">
-            <a:off x="419894" y="5828506"/>
+            <a:off x="1181894" y="5828506"/>
             <a:ext cx="838200" cy="1588"/>
           </a:xfrm>
           <a:prstGeom prst="line">
@@ -4182,7 +4182,7 @@
         </p:nvSpPr>
         <p:spPr bwMode="auto">
           <a:xfrm>
-            <a:off x="6019800" y="1295400"/>
+            <a:off x="6858000" y="1295400"/>
             <a:ext cx="1905000" cy="369332"/>
           </a:xfrm>
           <a:prstGeom prst="rect">
@@ -4221,7 +4221,7 @@
         </p:nvCxnSpPr>
         <p:spPr bwMode="auto">
           <a:xfrm rot="5400000">
-            <a:off x="6558501" y="3967702"/>
+            <a:off x="7320501" y="3967702"/>
             <a:ext cx="292608" cy="1588"/>
           </a:xfrm>
           <a:prstGeom prst="line">
@@ -4260,7 +4260,7 @@
         </p:nvSpPr>
         <p:spPr bwMode="auto">
           <a:xfrm>
-            <a:off x="533400" y="6248400"/>
+            <a:off x="1295400" y="6248400"/>
             <a:ext cx="685800" cy="457200"/>
           </a:xfrm>
           <a:prstGeom prst="ellipse">
@@ -4305,7 +4305,7 @@
         </p:nvSpPr>
         <p:spPr bwMode="auto">
           <a:xfrm>
-            <a:off x="625278" y="6324600"/>
+            <a:off x="1387278" y="6324600"/>
             <a:ext cx="441522" cy="307777"/>
           </a:xfrm>
           <a:prstGeom prst="rect">
@@ -4343,7 +4343,7 @@
         </p:nvSpPr>
         <p:spPr bwMode="auto">
           <a:xfrm>
-            <a:off x="5562600" y="2057400"/>
+            <a:off x="6096000" y="2057400"/>
             <a:ext cx="2514600" cy="738664"/>
           </a:xfrm>
           <a:prstGeom prst="rect">
@@ -4398,7 +4398,7 @@
         </p:nvSpPr>
         <p:spPr bwMode="auto">
           <a:xfrm>
-            <a:off x="5562600" y="2133600"/>
+            <a:off x="6096000" y="2133600"/>
             <a:ext cx="2057400" cy="685800"/>
           </a:xfrm>
           <a:prstGeom prst="rect">
@@ -4445,7 +4445,7 @@
         </p:nvSpPr>
         <p:spPr bwMode="auto">
           <a:xfrm>
-            <a:off x="4800600" y="4933890"/>
+            <a:off x="5562600" y="4933890"/>
             <a:ext cx="838200" cy="400110"/>
           </a:xfrm>
           <a:prstGeom prst="rect">
@@ -4489,7 +4489,7 @@
         </p:nvCxnSpPr>
         <p:spPr>
           <a:xfrm rot="5400000">
-            <a:off x="3848894" y="4761706"/>
+            <a:off x="4610894" y="4761706"/>
             <a:ext cx="1295400" cy="1588"/>
           </a:xfrm>
           <a:prstGeom prst="line">
@@ -4526,7 +4526,7 @@
         </p:nvSpPr>
         <p:spPr bwMode="auto">
           <a:xfrm>
-            <a:off x="6400800" y="3276600"/>
+            <a:off x="6781800" y="3276600"/>
             <a:ext cx="1371600" cy="533400"/>
           </a:xfrm>
           <a:prstGeom prst="rect">
@@ -4573,7 +4573,7 @@
         </p:nvSpPr>
         <p:spPr bwMode="auto">
           <a:xfrm>
-            <a:off x="6400800" y="3276600"/>
+            <a:off x="6781800" y="3276600"/>
             <a:ext cx="1219200" cy="523220"/>
           </a:xfrm>
           <a:prstGeom prst="rect">
@@ -4620,7 +4620,7 @@
         </p:nvCxnSpPr>
         <p:spPr bwMode="auto">
           <a:xfrm rot="5400000">
-            <a:off x="1529302" y="5555710"/>
+            <a:off x="2291302" y="5555710"/>
             <a:ext cx="292608" cy="1588"/>
           </a:xfrm>
           <a:prstGeom prst="line">
@@ -4659,7 +4659,7 @@
         </p:nvSpPr>
         <p:spPr bwMode="auto">
           <a:xfrm>
-            <a:off x="457200" y="4114800"/>
+            <a:off x="2362200" y="4114800"/>
             <a:ext cx="1600200" cy="914400"/>
           </a:xfrm>
           <a:prstGeom prst="rect">
@@ -4706,7 +4706,7 @@
         </p:nvSpPr>
         <p:spPr bwMode="auto">
           <a:xfrm>
-            <a:off x="381000" y="4122003"/>
+            <a:off x="2286000" y="4122003"/>
             <a:ext cx="1676400" cy="830997"/>
           </a:xfrm>
           <a:prstGeom prst="rect">
@@ -4761,7 +4761,7 @@
         </p:nvSpPr>
         <p:spPr bwMode="auto">
           <a:xfrm>
-            <a:off x="5943600" y="4114800"/>
+            <a:off x="6705600" y="4114800"/>
             <a:ext cx="1600200" cy="914400"/>
           </a:xfrm>
           <a:prstGeom prst="rect">
@@ -4808,7 +4808,7 @@
         </p:nvSpPr>
         <p:spPr bwMode="auto">
           <a:xfrm>
-            <a:off x="5867400" y="4122003"/>
+            <a:off x="6629400" y="4122003"/>
             <a:ext cx="1676400" cy="523220"/>
           </a:xfrm>
           <a:prstGeom prst="rect">
@@ -4852,8 +4852,8 @@
         </p:nvCxnSpPr>
         <p:spPr>
           <a:xfrm>
-            <a:off x="2057400" y="4875212"/>
-            <a:ext cx="3886200" cy="1588"/>
+            <a:off x="3962400" y="4876800"/>
+            <a:ext cx="2743200" cy="1588"/>
           </a:xfrm>
           <a:prstGeom prst="line">
             <a:avLst/>
@@ -4893,7 +4893,7 @@
         </p:nvSpPr>
         <p:spPr bwMode="auto">
           <a:xfrm>
-            <a:off x="6705600" y="3810000"/>
+            <a:off x="7772400" y="3810000"/>
             <a:ext cx="1676400" cy="307777"/>
           </a:xfrm>
           <a:prstGeom prst="rect">
@@ -4931,7 +4931,7 @@
         </p:nvSpPr>
         <p:spPr bwMode="auto">
           <a:xfrm>
-            <a:off x="3505200" y="1305580"/>
+            <a:off x="4419600" y="1305580"/>
             <a:ext cx="2514600" cy="523220"/>
           </a:xfrm>
           <a:prstGeom prst="rect">
@@ -4980,8 +4980,8 @@
         </p:nvSpPr>
         <p:spPr bwMode="auto">
           <a:xfrm>
-            <a:off x="3581400" y="1295400"/>
-            <a:ext cx="2286000" cy="685800"/>
+            <a:off x="4419600" y="1295400"/>
+            <a:ext cx="2438400" cy="685800"/>
           </a:xfrm>
           <a:prstGeom prst="rect">
             <a:avLst/>
@@ -5027,7 +5027,7 @@
         </p:nvSpPr>
         <p:spPr bwMode="auto">
           <a:xfrm>
-            <a:off x="3962400" y="3276600"/>
+            <a:off x="4495800" y="3276600"/>
             <a:ext cx="1447800" cy="533400"/>
           </a:xfrm>
           <a:prstGeom prst="rect">
@@ -5074,7 +5074,7 @@
         </p:nvSpPr>
         <p:spPr bwMode="auto">
           <a:xfrm>
-            <a:off x="3962400" y="3286780"/>
+            <a:off x="4495800" y="3286780"/>
             <a:ext cx="1447800" cy="523220"/>
           </a:xfrm>
           <a:prstGeom prst="rect">
@@ -5121,7 +5121,7 @@
         </p:nvCxnSpPr>
         <p:spPr>
           <a:xfrm flipV="1">
-            <a:off x="5105400" y="2819400"/>
+            <a:off x="5867400" y="2819400"/>
             <a:ext cx="990600" cy="457200"/>
           </a:xfrm>
           <a:prstGeom prst="line">
@@ -5160,7 +5160,7 @@
         </p:nvCxnSpPr>
         <p:spPr>
           <a:xfrm rot="5400000">
-            <a:off x="6858000" y="3048000"/>
+            <a:off x="7011194" y="3048000"/>
             <a:ext cx="457200" cy="1588"/>
           </a:xfrm>
           <a:prstGeom prst="line">
@@ -5201,8 +5201,8 @@
         </p:nvSpPr>
         <p:spPr bwMode="auto">
           <a:xfrm>
-            <a:off x="6096000" y="2847201"/>
-            <a:ext cx="990600" cy="276999"/>
+            <a:off x="7239000" y="2819401"/>
+            <a:ext cx="1676400" cy="461665"/>
           </a:xfrm>
           <a:prstGeom prst="rect">
             <a:avLst/>
@@ -5223,7 +5223,7 @@
           <a:p>
             <a:r>
               <a:rPr lang="en-US" sz="1200" dirty="0" smtClean="0"/>
-              <a:t>Host services</a:t>
+              <a:t>Host services by host OS for Guest OS</a:t>
             </a:r>
             <a:endParaRPr lang="en-US" sz="1200" dirty="0"/>
           </a:p>
@@ -5237,7 +5237,7 @@
         </p:nvCxnSpPr>
         <p:spPr>
           <a:xfrm rot="5400000">
-            <a:off x="3923506" y="2628900"/>
+            <a:off x="4382294" y="2628900"/>
             <a:ext cx="1295400" cy="1588"/>
           </a:xfrm>
           <a:prstGeom prst="line">
@@ -5276,8 +5276,8 @@
         </p:nvCxnSpPr>
         <p:spPr>
           <a:xfrm rot="16200000" flipH="1">
-            <a:off x="1943100" y="3619500"/>
-            <a:ext cx="685800" cy="609600"/>
+            <a:off x="1562100" y="3771899"/>
+            <a:ext cx="838202" cy="3"/>
           </a:xfrm>
           <a:prstGeom prst="line">
             <a:avLst/>
@@ -5317,7 +5317,7 @@
         </p:nvSpPr>
         <p:spPr bwMode="auto">
           <a:xfrm>
-            <a:off x="2362200" y="4267200"/>
+            <a:off x="1600200" y="4191000"/>
             <a:ext cx="685800" cy="381000"/>
           </a:xfrm>
           <a:prstGeom prst="rect">
@@ -5364,7 +5364,7 @@
         </p:nvSpPr>
         <p:spPr bwMode="auto">
           <a:xfrm>
-            <a:off x="2362200" y="4267200"/>
+            <a:off x="1600200" y="4188023"/>
             <a:ext cx="1371600" cy="307777"/>
           </a:xfrm>
           <a:prstGeom prst="rect">
@@ -5406,8 +5406,8 @@
         </p:nvSpPr>
         <p:spPr bwMode="auto">
           <a:xfrm>
-            <a:off x="2362200" y="3581400"/>
-            <a:ext cx="990600" cy="461665"/>
+            <a:off x="838200" y="3429000"/>
+            <a:ext cx="1600200" cy="646331"/>
           </a:xfrm>
           <a:prstGeom prst="rect">
             <a:avLst/>
@@ -5430,6 +5430,369 @@
               <a:rPr lang="en-US" sz="1200" dirty="0" smtClean="0"/>
               <a:t>Host  services</a:t>
             </a:r>
+          </a:p>
+          <a:p>
+            <a:r>
+              <a:rPr lang="en-US" sz="1200" dirty="0" smtClean="0"/>
+              <a:t>by hardware for </a:t>
+            </a:r>
+          </a:p>
+          <a:p>
+            <a:r>
+              <a:rPr lang="en-US" sz="1200" dirty="0" smtClean="0"/>
+              <a:t>Host OS</a:t>
+            </a:r>
+            <a:endParaRPr lang="en-US" sz="1200" dirty="0"/>
+          </a:p>
+        </p:txBody>
+      </p:sp>
+      <p:sp>
+        <p:nvSpPr>
+          <p:cNvPr id="55" name="Rectangle 7"/>
+          <p:cNvSpPr>
+            <a:spLocks noChangeArrowheads="1"/>
+          </p:cNvSpPr>
+          <p:nvPr/>
+        </p:nvSpPr>
+        <p:spPr bwMode="auto">
+          <a:xfrm>
+            <a:off x="2438400" y="1453753"/>
+            <a:ext cx="1600200" cy="914400"/>
+          </a:xfrm>
+          <a:prstGeom prst="rect">
+            <a:avLst/>
+          </a:prstGeom>
+          <a:noFill/>
+          <a:ln w="19050" algn="ctr">
+            <a:solidFill>
+              <a:srgbClr val="0000FF"/>
+            </a:solidFill>
+            <a:round/>
+            <a:headEnd/>
+            <a:tailEnd/>
+          </a:ln>
+        </p:spPr>
+        <p:txBody>
+          <a:bodyPr/>
+          <a:lstStyle/>
+          <a:p>
+            <a:pPr>
+              <a:lnSpc>
+                <a:spcPct val="90000"/>
+              </a:lnSpc>
+              <a:spcBef>
+                <a:spcPct val="20000"/>
+              </a:spcBef>
+              <a:buClr>
+                <a:schemeClr val="bg1"/>
+              </a:buClr>
+            </a:pPr>
+            <a:endParaRPr lang="en-US"/>
+          </a:p>
+        </p:txBody>
+      </p:sp>
+      <p:sp>
+        <p:nvSpPr>
+          <p:cNvPr id="57" name="TextBox 63"/>
+          <p:cNvSpPr txBox="1">
+            <a:spLocks noChangeArrowheads="1"/>
+          </p:cNvSpPr>
+          <p:nvPr/>
+        </p:nvSpPr>
+        <p:spPr bwMode="auto">
+          <a:xfrm>
+            <a:off x="2438400" y="1447800"/>
+            <a:ext cx="1905000" cy="615553"/>
+          </a:xfrm>
+          <a:prstGeom prst="rect">
+            <a:avLst/>
+          </a:prstGeom>
+          <a:noFill/>
+          <a:ln w="9525">
+            <a:noFill/>
+            <a:miter lim="800000"/>
+            <a:headEnd/>
+            <a:tailEnd/>
+          </a:ln>
+        </p:spPr>
+        <p:txBody>
+          <a:bodyPr wrap="square">
+            <a:spAutoFit/>
+          </a:bodyPr>
+          <a:lstStyle/>
+          <a:p>
+            <a:r>
+              <a:rPr lang="en-US" sz="1600" dirty="0" err="1" smtClean="0">
+                <a:solidFill>
+                  <a:srgbClr val="FF0000"/>
+                </a:solidFill>
+              </a:rPr>
+              <a:t>ncp.exe</a:t>
+            </a:r>
+            <a:endParaRPr lang="en-US" sz="1600" dirty="0" smtClean="0">
+              <a:solidFill>
+                <a:srgbClr val="FF0000"/>
+              </a:solidFill>
+            </a:endParaRPr>
+          </a:p>
+          <a:p>
+            <a:endParaRPr lang="en-US" b="1" dirty="0" smtClean="0">
+              <a:solidFill>
+                <a:srgbClr val="FF0000"/>
+              </a:solidFill>
+            </a:endParaRPr>
+          </a:p>
+        </p:txBody>
+      </p:sp>
+      <p:sp>
+        <p:nvSpPr>
+          <p:cNvPr id="61" name="TextBox 63"/>
+          <p:cNvSpPr txBox="1">
+            <a:spLocks noChangeArrowheads="1"/>
+          </p:cNvSpPr>
+          <p:nvPr/>
+        </p:nvSpPr>
+        <p:spPr bwMode="auto">
+          <a:xfrm>
+            <a:off x="2438400" y="1768733"/>
+            <a:ext cx="1905000" cy="523220"/>
+          </a:xfrm>
+          <a:prstGeom prst="rect">
+            <a:avLst/>
+          </a:prstGeom>
+          <a:noFill/>
+          <a:ln w="9525">
+            <a:noFill/>
+            <a:miter lim="800000"/>
+            <a:headEnd/>
+            <a:tailEnd/>
+          </a:ln>
+        </p:spPr>
+        <p:txBody>
+          <a:bodyPr wrap="square">
+            <a:spAutoFit/>
+          </a:bodyPr>
+          <a:lstStyle/>
+          <a:p>
+            <a:r>
+              <a:rPr lang="en-US" sz="1400" dirty="0" smtClean="0"/>
+              <a:t>Node Control</a:t>
+            </a:r>
+          </a:p>
+          <a:p>
+            <a:r>
+              <a:rPr lang="en-US" sz="1400" dirty="0" smtClean="0"/>
+              <a:t>Program</a:t>
+            </a:r>
+          </a:p>
+        </p:txBody>
+      </p:sp>
+      <p:cxnSp>
+        <p:nvCxnSpPr>
+          <p:cNvPr id="62" name="Straight Connector 61"/>
+          <p:cNvCxnSpPr/>
+          <p:nvPr/>
+        </p:nvCxnSpPr>
+        <p:spPr>
+          <a:xfrm rot="5400000">
+            <a:off x="2476500" y="3238501"/>
+            <a:ext cx="1752601" cy="1588"/>
+          </a:xfrm>
+          <a:prstGeom prst="line">
+            <a:avLst/>
+          </a:prstGeom>
+          <a:ln>
+            <a:solidFill>
+              <a:schemeClr val="accent5">
+                <a:lumMod val="75000"/>
+              </a:schemeClr>
+            </a:solidFill>
+            <a:headEnd type="arrow"/>
+            <a:tailEnd type="arrow"/>
+          </a:ln>
+        </p:spPr>
+        <p:style>
+          <a:lnRef idx="2">
+            <a:schemeClr val="accent1"/>
+          </a:lnRef>
+          <a:fillRef idx="0">
+            <a:schemeClr val="accent1"/>
+          </a:fillRef>
+          <a:effectRef idx="1">
+            <a:schemeClr val="accent1"/>
+          </a:effectRef>
+          <a:fontRef idx="minor">
+            <a:schemeClr val="tx1"/>
+          </a:fontRef>
+        </p:style>
+      </p:cxnSp>
+      <p:cxnSp>
+        <p:nvCxnSpPr>
+          <p:cNvPr id="65" name="Straight Connector 64"/>
+          <p:cNvCxnSpPr/>
+          <p:nvPr/>
+        </p:nvCxnSpPr>
+        <p:spPr>
+          <a:xfrm>
+            <a:off x="609600" y="1981200"/>
+            <a:ext cx="1828803" cy="1"/>
+          </a:xfrm>
+          <a:prstGeom prst="line">
+            <a:avLst/>
+          </a:prstGeom>
+          <a:ln>
+            <a:solidFill>
+              <a:schemeClr val="accent5">
+                <a:lumMod val="75000"/>
+              </a:schemeClr>
+            </a:solidFill>
+            <a:headEnd type="arrow"/>
+            <a:tailEnd type="arrow"/>
+          </a:ln>
+        </p:spPr>
+        <p:style>
+          <a:lnRef idx="2">
+            <a:schemeClr val="accent1"/>
+          </a:lnRef>
+          <a:fillRef idx="0">
+            <a:schemeClr val="accent1"/>
+          </a:fillRef>
+          <a:effectRef idx="1">
+            <a:schemeClr val="accent1"/>
+          </a:effectRef>
+          <a:fontRef idx="minor">
+            <a:schemeClr val="tx1"/>
+          </a:fontRef>
+        </p:style>
+      </p:cxnSp>
+      <p:sp>
+        <p:nvSpPr>
+          <p:cNvPr id="72" name="TextBox 63"/>
+          <p:cNvSpPr txBox="1">
+            <a:spLocks noChangeArrowheads="1"/>
+          </p:cNvSpPr>
+          <p:nvPr/>
+        </p:nvSpPr>
+        <p:spPr bwMode="auto">
+          <a:xfrm>
+            <a:off x="-76200" y="1639669"/>
+            <a:ext cx="990600" cy="646331"/>
+          </a:xfrm>
+          <a:prstGeom prst="rect">
+            <a:avLst/>
+          </a:prstGeom>
+          <a:noFill/>
+          <a:ln w="9525">
+            <a:noFill/>
+            <a:miter lim="800000"/>
+            <a:headEnd/>
+            <a:tailEnd/>
+          </a:ln>
+        </p:spPr>
+        <p:txBody>
+          <a:bodyPr wrap="square">
+            <a:spAutoFit/>
+          </a:bodyPr>
+          <a:lstStyle/>
+          <a:p>
+            <a:r>
+              <a:rPr lang="en-US" sz="1200" dirty="0" smtClean="0"/>
+              <a:t>Data Center</a:t>
+            </a:r>
+          </a:p>
+          <a:p>
+            <a:r>
+              <a:rPr lang="en-US" sz="1200" dirty="0" smtClean="0"/>
+              <a:t>Fabric control</a:t>
+            </a:r>
+            <a:endParaRPr lang="en-US" sz="1200" dirty="0"/>
+          </a:p>
+        </p:txBody>
+      </p:sp>
+      <p:sp>
+        <p:nvSpPr>
+          <p:cNvPr id="76" name="TextBox 63"/>
+          <p:cNvSpPr txBox="1">
+            <a:spLocks noChangeArrowheads="1"/>
+          </p:cNvSpPr>
+          <p:nvPr/>
+        </p:nvSpPr>
+        <p:spPr bwMode="auto">
+          <a:xfrm>
+            <a:off x="3352800" y="3152001"/>
+            <a:ext cx="990600" cy="646331"/>
+          </a:xfrm>
+          <a:prstGeom prst="rect">
+            <a:avLst/>
+          </a:prstGeom>
+          <a:noFill/>
+          <a:ln w="9525">
+            <a:noFill/>
+            <a:miter lim="800000"/>
+            <a:headEnd/>
+            <a:tailEnd/>
+          </a:ln>
+        </p:spPr>
+        <p:txBody>
+          <a:bodyPr wrap="square">
+            <a:spAutoFit/>
+          </a:bodyPr>
+          <a:lstStyle/>
+          <a:p>
+            <a:r>
+              <a:rPr lang="en-US" sz="1200" dirty="0" smtClean="0"/>
+              <a:t>Host services</a:t>
+            </a:r>
+          </a:p>
+          <a:p>
+            <a:r>
+              <a:rPr lang="en-US" sz="1200" dirty="0" smtClean="0"/>
+              <a:t>for host</a:t>
+            </a:r>
+          </a:p>
+          <a:p>
+            <a:r>
+              <a:rPr lang="en-US" sz="1200" dirty="0" smtClean="0"/>
+              <a:t>programs</a:t>
+            </a:r>
+            <a:endParaRPr lang="en-US" sz="1200" dirty="0"/>
+          </a:p>
+        </p:txBody>
+      </p:sp>
+      <p:sp>
+        <p:nvSpPr>
+          <p:cNvPr id="81" name="TextBox 63"/>
+          <p:cNvSpPr txBox="1">
+            <a:spLocks noChangeArrowheads="1"/>
+          </p:cNvSpPr>
+          <p:nvPr/>
+        </p:nvSpPr>
+        <p:spPr bwMode="auto">
+          <a:xfrm>
+            <a:off x="5029200" y="2362200"/>
+            <a:ext cx="990600" cy="830997"/>
+          </a:xfrm>
+          <a:prstGeom prst="rect">
+            <a:avLst/>
+          </a:prstGeom>
+          <a:noFill/>
+          <a:ln w="9525">
+            <a:noFill/>
+            <a:miter lim="800000"/>
+            <a:headEnd/>
+            <a:tailEnd/>
+          </a:ln>
+        </p:spPr>
+        <p:txBody>
+          <a:bodyPr wrap="square">
+            <a:spAutoFit/>
+          </a:bodyPr>
+          <a:lstStyle/>
+          <a:p>
+            <a:r>
+              <a:rPr lang="en-US" sz="1200" dirty="0" smtClean="0"/>
+              <a:t>Host services by guest OS for applications</a:t>
+            </a:r>
             <a:endParaRPr lang="en-US" sz="1200" dirty="0"/>
           </a:p>
         </p:txBody>
@@ -5437,7 +5800,7 @@
     </p:spTree>
     <p:extLst>
       <p:ext uri="{BB962C8B-B14F-4D97-AF65-F5344CB8AC3E}">
-        <p14:creationId xmlns="" xmlns:a="http://schemas.openxmlformats.org/drawingml/2006/main" xmlns:r="http://schemas.openxmlformats.org/officeDocument/2006/relationships" xmlns:p="http://schemas.openxmlformats.org/presentationml/2006/main" xmlns:p14="http://schemas.microsoft.com/office/powerpoint/2010/main" xmlns:mv="urn:schemas-microsoft-com:mac:vml" xmlns:mc="http://schemas.openxmlformats.org/markup-compatibility/2006" val="3115145481"/>
+        <p14:creationId xmlns:mc="http://schemas.openxmlformats.org/markup-compatibility/2006" xmlns:mv="urn:schemas-microsoft-com:mac:vml" xmlns:p14="http://schemas.microsoft.com/office/powerpoint/2010/main" xmlns:p="http://schemas.openxmlformats.org/presentationml/2006/main" xmlns:r="http://schemas.openxmlformats.org/officeDocument/2006/relationships" xmlns:a="http://schemas.openxmlformats.org/drawingml/2006/main" xmlns="" val="3115145481"/>
       </p:ext>
     </p:extLst>
   </p:cSld>

</xml_diff>